<commit_message>
Added a resource to my slides
</commit_message>
<xml_diff>
--- a/Slides/CSharp-6-New-Language-Features.pptx
+++ b/Slides/CSharp-6-New-Language-Features.pptx
@@ -132,6 +132,9 @@
     <p:ext uri="{EFAFB233-063F-42B5-8137-9DF3F51BA10A}">
       <p15:sldGuideLst xmlns:p15="http://schemas.microsoft.com/office/powerpoint/2012/main"/>
     </p:ext>
+    <p:ext uri="{2D200454-40CA-4A62-9FC3-DE9A4176ACB9}">
+      <p15:notesGuideLst xmlns:p15="http://schemas.microsoft.com/office/powerpoint/2012/main"/>
+    </p:ext>
   </p:extLst>
 </p:presentation>
 </file>
@@ -218,7 +221,7 @@
           <a:p>
             <a:fld id="{33E5E0E6-2657-4385-902D-2810122CB8F7}" type="datetimeFigureOut">
               <a:rPr lang="en-US" smtClean="0"/>
-              <a:t>2/7/2016</a:t>
+              <a:t>2/9/2016</a:t>
             </a:fld>
             <a:endParaRPr lang="en-US"/>
           </a:p>
@@ -1446,7 +1449,7 @@
           <a:p>
             <a:fld id="{0EE1B543-F909-4FF1-B2FE-428AB4A87B52}" type="datetime1">
               <a:rPr lang="en-US" smtClean="0"/>
-              <a:t>2/7/2016</a:t>
+              <a:t>2/9/2016</a:t>
             </a:fld>
             <a:endParaRPr lang="en-US" dirty="0"/>
           </a:p>
@@ -1617,13 +1620,6 @@
   <p:clrMapOvr>
     <a:masterClrMapping/>
   </p:clrMapOvr>
-  <p:timing>
-    <p:tnLst>
-      <p:par>
-        <p:cTn id="1" dur="indefinite" restart="never" nodeType="tmRoot"/>
-      </p:par>
-    </p:tnLst>
-  </p:timing>
 </p:sldLayout>
 </file>
 
@@ -1736,7 +1732,7 @@
           <a:p>
             <a:fld id="{B6E37EB7-D403-45A2-AB5E-D280C516BC85}" type="datetime1">
               <a:rPr lang="en-US" smtClean="0"/>
-              <a:t>2/7/2016</a:t>
+              <a:t>2/9/2016</a:t>
             </a:fld>
             <a:endParaRPr lang="en-US" dirty="0"/>
           </a:p>
@@ -1897,13 +1893,6 @@
   <p:clrMapOvr>
     <a:masterClrMapping/>
   </p:clrMapOvr>
-  <p:timing>
-    <p:tnLst>
-      <p:par>
-        <p:cTn id="1" dur="indefinite" restart="never" nodeType="tmRoot"/>
-      </p:par>
-    </p:tnLst>
-  </p:timing>
 </p:sldLayout>
 </file>
 
@@ -2030,7 +2019,7 @@
           <a:p>
             <a:fld id="{78D6D4BB-0428-4E19-B8E6-33EBEF93452B}" type="datetime1">
               <a:rPr lang="en-US" smtClean="0"/>
-              <a:t>2/7/2016</a:t>
+              <a:t>2/9/2016</a:t>
             </a:fld>
             <a:endParaRPr lang="en-US" dirty="0"/>
           </a:p>
@@ -2191,13 +2180,6 @@
   <p:clrMapOvr>
     <a:masterClrMapping/>
   </p:clrMapOvr>
-  <p:timing>
-    <p:tnLst>
-      <p:par>
-        <p:cTn id="1" dur="indefinite" restart="never" nodeType="tmRoot"/>
-      </p:par>
-    </p:tnLst>
-  </p:timing>
 </p:sldLayout>
 </file>
 
@@ -2314,7 +2296,7 @@
           <a:p>
             <a:fld id="{E2EB21BC-B6B7-45A0-831A-39A08F64FEEE}" type="datetime1">
               <a:rPr lang="en-US" smtClean="0"/>
-              <a:t>2/7/2016</a:t>
+              <a:t>2/9/2016</a:t>
             </a:fld>
             <a:endParaRPr lang="en-US" dirty="0"/>
           </a:p>
@@ -2479,13 +2461,6 @@
   <p:clrMapOvr>
     <a:masterClrMapping/>
   </p:clrMapOvr>
-  <p:timing>
-    <p:tnLst>
-      <p:par>
-        <p:cTn id="1" dur="indefinite" restart="never" nodeType="tmRoot"/>
-      </p:par>
-    </p:tnLst>
-  </p:timing>
 </p:sldLayout>
 </file>
 
@@ -2676,7 +2651,7 @@
           <a:p>
             <a:fld id="{D01B1534-8D07-4037-A73D-B2B2270F597C}" type="datetime1">
               <a:rPr lang="en-US" smtClean="0"/>
-              <a:t>2/7/2016</a:t>
+              <a:t>2/9/2016</a:t>
             </a:fld>
             <a:endParaRPr lang="en-US" dirty="0"/>
           </a:p>
@@ -2837,13 +2812,6 @@
   <p:clrMapOvr>
     <a:masterClrMapping/>
   </p:clrMapOvr>
-  <p:timing>
-    <p:tnLst>
-      <p:par>
-        <p:cTn id="1" dur="indefinite" restart="never" nodeType="tmRoot"/>
-      </p:par>
-    </p:tnLst>
-  </p:timing>
 </p:sldLayout>
 </file>
 
@@ -3023,7 +2991,7 @@
           <a:p>
             <a:fld id="{3BA250D4-12A0-43C8-A1CF-99BCBDD8B988}" type="datetime1">
               <a:rPr lang="en-US" smtClean="0"/>
-              <a:t>2/7/2016</a:t>
+              <a:t>2/9/2016</a:t>
             </a:fld>
             <a:endParaRPr lang="en-US" dirty="0"/>
           </a:p>
@@ -3184,13 +3152,6 @@
   <p:clrMapOvr>
     <a:masterClrMapping/>
   </p:clrMapOvr>
-  <p:timing>
-    <p:tnLst>
-      <p:par>
-        <p:cTn id="1" dur="indefinite" restart="never" nodeType="tmRoot"/>
-      </p:par>
-    </p:tnLst>
-  </p:timing>
 </p:sldLayout>
 </file>
 
@@ -3518,7 +3479,7 @@
           <a:p>
             <a:fld id="{E59661DB-8378-4CD0-AFBE-01F12CFCF0EB}" type="datetime1">
               <a:rPr lang="en-US" smtClean="0"/>
-              <a:t>2/7/2016</a:t>
+              <a:t>2/9/2016</a:t>
             </a:fld>
             <a:endParaRPr lang="en-US" dirty="0"/>
           </a:p>
@@ -3679,13 +3640,6 @@
   <p:clrMapOvr>
     <a:masterClrMapping/>
   </p:clrMapOvr>
-  <p:timing>
-    <p:tnLst>
-      <p:par>
-        <p:cTn id="1" dur="indefinite" restart="never" nodeType="tmRoot"/>
-      </p:par>
-    </p:tnLst>
-  </p:timing>
 </p:sldLayout>
 </file>
 
@@ -3746,7 +3700,7 @@
           <a:p>
             <a:fld id="{47978105-B0CE-4596-84BB-C9F093A62A71}" type="datetime1">
               <a:rPr lang="en-US" smtClean="0"/>
-              <a:t>2/7/2016</a:t>
+              <a:t>2/9/2016</a:t>
             </a:fld>
             <a:endParaRPr lang="en-US" dirty="0"/>
           </a:p>
@@ -3907,13 +3861,6 @@
   <p:clrMapOvr>
     <a:masterClrMapping/>
   </p:clrMapOvr>
-  <p:timing>
-    <p:tnLst>
-      <p:par>
-        <p:cTn id="1" dur="indefinite" restart="never" nodeType="tmRoot"/>
-      </p:par>
-    </p:tnLst>
-  </p:timing>
 </p:sldLayout>
 </file>
 
@@ -3951,7 +3898,7 @@
           <a:p>
             <a:fld id="{525E11DF-B9CA-48C5-81E6-337899557DC2}" type="datetime1">
               <a:rPr lang="en-US" smtClean="0"/>
-              <a:t>2/7/2016</a:t>
+              <a:t>2/9/2016</a:t>
             </a:fld>
             <a:endParaRPr lang="en-US" dirty="0"/>
           </a:p>
@@ -4072,13 +4019,6 @@
   <p:clrMapOvr>
     <a:masterClrMapping/>
   </p:clrMapOvr>
-  <p:timing>
-    <p:tnLst>
-      <p:par>
-        <p:cTn id="1" dur="indefinite" restart="never" nodeType="tmRoot"/>
-      </p:par>
-    </p:tnLst>
-  </p:timing>
 </p:sldLayout>
 </file>
 
@@ -4272,7 +4212,7 @@
           <a:p>
             <a:fld id="{4803EA06-4E45-4653-A29C-5A7E490F3733}" type="datetime1">
               <a:rPr lang="en-US" smtClean="0"/>
-              <a:t>2/7/2016</a:t>
+              <a:t>2/9/2016</a:t>
             </a:fld>
             <a:endParaRPr lang="en-US" dirty="0"/>
           </a:p>
@@ -4433,13 +4373,6 @@
   <p:clrMapOvr>
     <a:masterClrMapping/>
   </p:clrMapOvr>
-  <p:timing>
-    <p:tnLst>
-      <p:par>
-        <p:cTn id="1" dur="indefinite" restart="never" nodeType="tmRoot"/>
-      </p:par>
-    </p:tnLst>
-  </p:timing>
 </p:sldLayout>
 </file>
 
@@ -4802,7 +4735,7 @@
           <a:p>
             <a:fld id="{2DB3552D-7290-43DD-AD07-60F561629260}" type="datetime1">
               <a:rPr lang="en-US" smtClean="0"/>
-              <a:t>2/7/2016</a:t>
+              <a:t>2/9/2016</a:t>
             </a:fld>
             <a:endParaRPr lang="en-US" dirty="0"/>
           </a:p>
@@ -4973,13 +4906,6 @@
   <p:clrMapOvr>
     <a:masterClrMapping/>
   </p:clrMapOvr>
-  <p:timing>
-    <p:tnLst>
-      <p:par>
-        <p:cTn id="1" dur="indefinite" restart="never" nodeType="tmRoot"/>
-      </p:par>
-    </p:tnLst>
-  </p:timing>
 </p:sldLayout>
 </file>
 
@@ -5253,7 +5179,7 @@
           <a:p>
             <a:fld id="{BC367024-4554-4F1F-91AB-08006E299A3C}" type="datetime1">
               <a:rPr lang="en-US" smtClean="0"/>
-              <a:t>2/7/2016</a:t>
+              <a:t>2/9/2016</a:t>
             </a:fld>
             <a:endParaRPr lang="en-US" dirty="0"/>
           </a:p>
@@ -5420,13 +5346,6 @@
     <p:sldLayoutId id="2147483658" r:id="rId10"/>
     <p:sldLayoutId id="2147483659" r:id="rId11"/>
   </p:sldLayoutIdLst>
-  <p:timing>
-    <p:tnLst>
-      <p:par>
-        <p:cTn id="1" dur="indefinite" restart="never" nodeType="tmRoot"/>
-      </p:par>
-    </p:tnLst>
-  </p:timing>
   <p:hf sldNum="0" hdr="0" ftr="0" dt="0"/>
   <p:txStyles>
     <p:titleStyle>
@@ -5849,13 +5768,6 @@
   <p:clrMapOvr>
     <a:masterClrMapping/>
   </p:clrMapOvr>
-  <p:timing>
-    <p:tnLst>
-      <p:par>
-        <p:cTn id="1" dur="indefinite" restart="never" nodeType="tmRoot"/>
-      </p:par>
-    </p:tnLst>
-  </p:timing>
 </p:sld>
 </file>
 
@@ -6916,13 +6828,6 @@
   <p:clrMapOvr>
     <a:masterClrMapping/>
   </p:clrMapOvr>
-  <p:timing>
-    <p:tnLst>
-      <p:par>
-        <p:cTn id="1" dur="indefinite" restart="never" nodeType="tmRoot"/>
-      </p:par>
-    </p:tnLst>
-  </p:timing>
 </p:sld>
 </file>
 
@@ -8130,13 +8035,6 @@
   <p:clrMapOvr>
     <a:masterClrMapping/>
   </p:clrMapOvr>
-  <p:timing>
-    <p:tnLst>
-      <p:par>
-        <p:cTn id="1" dur="indefinite" restart="never" nodeType="tmRoot"/>
-      </p:par>
-    </p:tnLst>
-  </p:timing>
 </p:sld>
 </file>
 
@@ -8817,13 +8715,6 @@
   <p:clrMapOvr>
     <a:masterClrMapping/>
   </p:clrMapOvr>
-  <p:timing>
-    <p:tnLst>
-      <p:par>
-        <p:cTn id="1" dur="indefinite" restart="never" nodeType="tmRoot"/>
-      </p:par>
-    </p:tnLst>
-  </p:timing>
 </p:sld>
 </file>
 
@@ -8924,13 +8815,6 @@
   <p:clrMapOvr>
     <a:masterClrMapping/>
   </p:clrMapOvr>
-  <p:timing>
-    <p:tnLst>
-      <p:par>
-        <p:cTn id="1" dur="indefinite" restart="never" nodeType="tmRoot"/>
-      </p:par>
-    </p:tnLst>
-  </p:timing>
 </p:sld>
 </file>
 
@@ -10050,13 +9934,6 @@
   <p:clrMapOvr>
     <a:masterClrMapping/>
   </p:clrMapOvr>
-  <p:timing>
-    <p:tnLst>
-      <p:par>
-        <p:cTn id="1" dur="indefinite" restart="never" nodeType="tmRoot"/>
-      </p:par>
-    </p:tnLst>
-  </p:timing>
 </p:sld>
 </file>
 
@@ -10693,13 +10570,6 @@
   <p:clrMapOvr>
     <a:masterClrMapping/>
   </p:clrMapOvr>
-  <p:timing>
-    <p:tnLst>
-      <p:par>
-        <p:cTn id="1" dur="indefinite" restart="never" nodeType="tmRoot"/>
-      </p:par>
-    </p:tnLst>
-  </p:timing>
 </p:sld>
 </file>
 
@@ -11189,13 +11059,6 @@
   <p:clrMapOvr>
     <a:masterClrMapping/>
   </p:clrMapOvr>
-  <p:timing>
-    <p:tnLst>
-      <p:par>
-        <p:cTn id="1" dur="indefinite" restart="never" nodeType="tmRoot"/>
-      </p:par>
-    </p:tnLst>
-  </p:timing>
 </p:sld>
 </file>
 
@@ -11284,13 +11147,6 @@
   <p:clrMapOvr>
     <a:masterClrMapping/>
   </p:clrMapOvr>
-  <p:timing>
-    <p:tnLst>
-      <p:par>
-        <p:cTn id="1" dur="indefinite" restart="never" nodeType="tmRoot"/>
-      </p:par>
-    </p:tnLst>
-  </p:timing>
 </p:sld>
 </file>
 
@@ -12142,13 +11998,6 @@
   <p:clrMapOvr>
     <a:masterClrMapping/>
   </p:clrMapOvr>
-  <p:timing>
-    <p:tnLst>
-      <p:par>
-        <p:cTn id="1" dur="indefinite" restart="never" nodeType="tmRoot"/>
-      </p:par>
-    </p:tnLst>
-  </p:timing>
 </p:sld>
 </file>
 
@@ -12794,13 +12643,6 @@
   <p:clrMapOvr>
     <a:masterClrMapping/>
   </p:clrMapOvr>
-  <p:timing>
-    <p:tnLst>
-      <p:par>
-        <p:cTn id="1" dur="indefinite" restart="never" nodeType="tmRoot"/>
-      </p:par>
-    </p:tnLst>
-  </p:timing>
 </p:sld>
 </file>
 
@@ -12872,16 +12714,11 @@
               <a:rPr lang="en-US" i="1" dirty="0" smtClean="0"/>
               <a:t>InfoCraft.net</a:t>
             </a:r>
-            <a:endParaRPr lang="en-US" i="1" dirty="0" smtClean="0"/>
           </a:p>
           <a:p>
             <a:r>
               <a:rPr lang="en-US" dirty="0" smtClean="0"/>
-              <a:t>North </a:t>
-            </a:r>
-            <a:r>
-              <a:rPr lang="en-US" dirty="0" smtClean="0"/>
-              <a:t>Houston </a:t>
+              <a:t>North Houston </a:t>
             </a:r>
             <a:r>
               <a:rPr lang="en-US" dirty="0" err="1" smtClean="0"/>
@@ -13001,13 +12838,6 @@
       <p:transition spd="slow"/>
     </mc:Fallback>
   </mc:AlternateContent>
-  <p:timing>
-    <p:tnLst>
-      <p:par>
-        <p:cTn id="1" dur="indefinite" restart="never" nodeType="tmRoot"/>
-      </p:par>
-    </p:tnLst>
-  </p:timing>
 </p:sld>
 </file>
 
@@ -13827,13 +13657,6 @@
   <p:clrMapOvr>
     <a:masterClrMapping/>
   </p:clrMapOvr>
-  <p:timing>
-    <p:tnLst>
-      <p:par>
-        <p:cTn id="1" dur="indefinite" restart="never" nodeType="tmRoot"/>
-      </p:par>
-    </p:tnLst>
-  </p:timing>
 </p:sld>
 </file>
 
@@ -14181,13 +14004,6 @@
   <p:clrMapOvr>
     <a:masterClrMapping/>
   </p:clrMapOvr>
-  <p:timing>
-    <p:tnLst>
-      <p:par>
-        <p:cTn id="1" dur="indefinite" restart="never" nodeType="tmRoot"/>
-      </p:par>
-    </p:tnLst>
-  </p:timing>
 </p:sld>
 </file>
 
@@ -14309,13 +14125,7 @@
               <a:rPr lang="en-US">
                 <a:hlinkClick r:id="rId4"/>
               </a:rPr>
-              <a:t>https</a:t>
-            </a:r>
-            <a:r>
-              <a:rPr lang="en-US">
-                <a:hlinkClick r:id="rId4"/>
-              </a:rPr>
-              <a:t>://</a:t>
+              <a:t>https://</a:t>
             </a:r>
             <a:r>
               <a:rPr lang="en-US" smtClean="0">
@@ -14323,10 +14133,39 @@
               </a:rPr>
               <a:t>github.com/jmreynolds/CSharp-6-New-Language-Features</a:t>
             </a:r>
+            <a:r>
+              <a:rPr lang="en-US"/>
+              <a:t/>
+            </a:r>
+            <a:br>
+              <a:rPr lang="en-US"/>
+            </a:br>
+            <a:r>
+              <a:rPr lang="en-US">
+                <a:hlinkClick r:id="rId5"/>
+              </a:rPr>
+              <a:t>http://</a:t>
+            </a:r>
+            <a:r>
+              <a:rPr lang="en-US">
+                <a:hlinkClick r:id="rId5"/>
+              </a:rPr>
+              <a:t>jmreynolds.github.io/CSharp-6-New-Language-Features</a:t>
+            </a:r>
+            <a:r>
+              <a:rPr lang="en-US" smtClean="0">
+                <a:hlinkClick r:id="rId5"/>
+              </a:rPr>
+              <a:t>/</a:t>
+            </a:r>
+            <a:r>
+              <a:rPr lang="en-US" smtClean="0"/>
+              <a:t> </a:t>
+            </a:r>
             <a:endParaRPr lang="en-US" smtClean="0"/>
           </a:p>
           <a:p>
-            <a:endParaRPr lang="en-US"/>
+            <a:endParaRPr lang="en-US" dirty="0"/>
           </a:p>
         </p:txBody>
       </p:sp>
@@ -14340,13 +14179,6 @@
   <p:clrMapOvr>
     <a:masterClrMapping/>
   </p:clrMapOvr>
-  <p:timing>
-    <p:tnLst>
-      <p:par>
-        <p:cTn id="1" dur="indefinite" restart="never" nodeType="tmRoot"/>
-      </p:par>
-    </p:tnLst>
-  </p:timing>
 </p:sld>
 </file>
 
@@ -14955,13 +14787,6 @@
   <p:clrMapOvr>
     <a:masterClrMapping/>
   </p:clrMapOvr>
-  <p:timing>
-    <p:tnLst>
-      <p:par>
-        <p:cTn id="1" dur="indefinite" restart="never" nodeType="tmRoot"/>
-      </p:par>
-    </p:tnLst>
-  </p:timing>
 </p:sld>
 </file>
 
@@ -15453,13 +15278,6 @@
   <p:clrMapOvr>
     <a:masterClrMapping/>
   </p:clrMapOvr>
-  <p:timing>
-    <p:tnLst>
-      <p:par>
-        <p:cTn id="1" dur="indefinite" restart="never" nodeType="tmRoot"/>
-      </p:par>
-    </p:tnLst>
-  </p:timing>
 </p:sld>
 </file>
 
@@ -15608,13 +15426,6 @@
   <p:clrMapOvr>
     <a:masterClrMapping/>
   </p:clrMapOvr>
-  <p:timing>
-    <p:tnLst>
-      <p:par>
-        <p:cTn id="1" dur="indefinite" restart="never" nodeType="tmRoot"/>
-      </p:par>
-    </p:tnLst>
-  </p:timing>
 </p:sld>
 </file>
 
@@ -17098,13 +16909,6 @@
   <p:clrMapOvr>
     <a:masterClrMapping/>
   </p:clrMapOvr>
-  <p:timing>
-    <p:tnLst>
-      <p:par>
-        <p:cTn id="1" dur="indefinite" restart="never" nodeType="tmRoot"/>
-      </p:par>
-    </p:tnLst>
-  </p:timing>
 </p:sld>
 </file>
 
@@ -18859,13 +18663,6 @@
   <p:clrMapOvr>
     <a:masterClrMapping/>
   </p:clrMapOvr>
-  <p:timing>
-    <p:tnLst>
-      <p:par>
-        <p:cTn id="1" dur="indefinite" restart="never" nodeType="tmRoot"/>
-      </p:par>
-    </p:tnLst>
-  </p:timing>
 </p:sld>
 </file>
 
@@ -19978,13 +19775,6 @@
   <p:clrMapOvr>
     <a:masterClrMapping/>
   </p:clrMapOvr>
-  <p:timing>
-    <p:tnLst>
-      <p:par>
-        <p:cTn id="1" dur="indefinite" restart="never" nodeType="tmRoot"/>
-      </p:par>
-    </p:tnLst>
-  </p:timing>
 </p:sld>
 </file>
 
@@ -22035,13 +21825,6 @@
   <p:clrMapOvr>
     <a:masterClrMapping/>
   </p:clrMapOvr>
-  <p:timing>
-    <p:tnLst>
-      <p:par>
-        <p:cTn id="1" dur="indefinite" restart="never" nodeType="tmRoot"/>
-      </p:par>
-    </p:tnLst>
-  </p:timing>
 </p:sld>
 </file>
 

</xml_diff>

<commit_message>
Updated Slides for Houston TechFest 2016
</commit_message>
<xml_diff>
--- a/Slides/CSharp-6-New-Language-Features.pptx
+++ b/Slides/CSharp-6-New-Language-Features.pptx
@@ -5,7 +5,7 @@
     <p:sldMasterId id="2147483660" r:id="rId1"/>
   </p:sldMasterIdLst>
   <p:notesMasterIdLst>
-    <p:notesMasterId r:id="rId30"/>
+    <p:notesMasterId r:id="rId29"/>
   </p:notesMasterIdLst>
   <p:sldIdLst>
     <p:sldId id="256" r:id="rId2"/>
@@ -34,8 +34,7 @@
     <p:sldId id="276" r:id="rId25"/>
     <p:sldId id="277" r:id="rId26"/>
     <p:sldId id="285" r:id="rId27"/>
-    <p:sldId id="283" r:id="rId28"/>
-    <p:sldId id="278" r:id="rId29"/>
+    <p:sldId id="278" r:id="rId28"/>
   </p:sldIdLst>
   <p:sldSz cx="12192000" cy="6858000"/>
   <p:notesSz cx="6858000" cy="9144000"/>
@@ -227,7 +226,7 @@
           <a:p>
             <a:fld id="{33E5E0E6-2657-4385-902D-2810122CB8F7}" type="datetimeFigureOut">
               <a:rPr lang="en-US" smtClean="0"/>
-              <a:t>8/5/2016</a:t>
+              <a:t>9/23/2016</a:t>
             </a:fld>
             <a:endParaRPr lang="en-US"/>
           </a:p>
@@ -589,7 +588,7 @@
             <a:fld id="{81331B57-0BE5-4F82-AA58-76F53EFF3ADA}" type="datetime8">
               <a:rPr lang="en-US" smtClean="0"/>
               <a:pPr/>
-              <a:t>8/5/2016 8:10 AM</a:t>
+              <a:t>9/23/2016 10:03 PM</a:t>
             </a:fld>
             <a:endParaRPr lang="en-US" dirty="0"/>
           </a:p>
@@ -1129,214 +1128,6 @@
 </p:notes>
 </file>
 
-<file path=ppt/notesSlides/notesSlide13.xml><?xml version="1.0" encoding="utf-8"?>
-<p:notes xmlns:a="http://schemas.openxmlformats.org/drawingml/2006/main" xmlns:r="http://schemas.openxmlformats.org/officeDocument/2006/relationships" xmlns:p="http://schemas.openxmlformats.org/presentationml/2006/main">
-  <p:cSld>
-    <p:spTree>
-      <p:nvGrpSpPr>
-        <p:cNvPr id="1" name=""/>
-        <p:cNvGrpSpPr/>
-        <p:nvPr/>
-      </p:nvGrpSpPr>
-      <p:grpSpPr>
-        <a:xfrm>
-          <a:off x="0" y="0"/>
-          <a:ext cx="0" cy="0"/>
-          <a:chOff x="0" y="0"/>
-          <a:chExt cx="0" cy="0"/>
-        </a:xfrm>
-      </p:grpSpPr>
-      <p:sp>
-        <p:nvSpPr>
-          <p:cNvPr id="2" name="Slide Image Placeholder 1"/>
-          <p:cNvSpPr>
-            <a:spLocks noGrp="1" noRot="1" noChangeAspect="1"/>
-          </p:cNvSpPr>
-          <p:nvPr>
-            <p:ph type="sldImg"/>
-          </p:nvPr>
-        </p:nvSpPr>
-        <p:spPr>
-          <a:xfrm>
-            <a:off x="685800" y="1143000"/>
-            <a:ext cx="5486400" cy="3086100"/>
-          </a:xfrm>
-        </p:spPr>
-      </p:sp>
-      <p:sp>
-        <p:nvSpPr>
-          <p:cNvPr id="3" name="Notes Placeholder 2"/>
-          <p:cNvSpPr>
-            <a:spLocks noGrp="1"/>
-          </p:cNvSpPr>
-          <p:nvPr>
-            <p:ph type="body" idx="1"/>
-          </p:nvPr>
-        </p:nvSpPr>
-        <p:spPr/>
-        <p:txBody>
-          <a:bodyPr>
-            <a:normAutofit/>
-          </a:bodyPr>
-          <a:lstStyle/>
-          <a:p>
-            <a:endParaRPr lang="en-US" dirty="0"/>
-          </a:p>
-        </p:txBody>
-      </p:sp>
-      <p:sp>
-        <p:nvSpPr>
-          <p:cNvPr id="4" name="Header Placeholder 3"/>
-          <p:cNvSpPr>
-            <a:spLocks noGrp="1"/>
-          </p:cNvSpPr>
-          <p:nvPr>
-            <p:ph type="hdr" sz="quarter" idx="10"/>
-          </p:nvPr>
-        </p:nvSpPr>
-        <p:spPr/>
-        <p:txBody>
-          <a:bodyPr/>
-          <a:lstStyle/>
-          <a:p>
-            <a:r>
-              <a:rPr lang="en-US" dirty="0"/>
-              <a:t>TechReady11</a:t>
-            </a:r>
-          </a:p>
-        </p:txBody>
-      </p:sp>
-      <p:sp>
-        <p:nvSpPr>
-          <p:cNvPr id="5" name="Date Placeholder 4"/>
-          <p:cNvSpPr>
-            <a:spLocks noGrp="1"/>
-          </p:cNvSpPr>
-          <p:nvPr>
-            <p:ph type="dt" idx="11"/>
-          </p:nvPr>
-        </p:nvSpPr>
-        <p:spPr/>
-        <p:txBody>
-          <a:bodyPr/>
-          <a:lstStyle/>
-          <a:p>
-            <a:fld id="{81331B57-0BE5-4F82-AA58-76F53EFF3ADA}" type="datetime8">
-              <a:rPr lang="en-US" smtClean="0"/>
-              <a:pPr/>
-              <a:t>8/5/2016 8:10 AM</a:t>
-            </a:fld>
-            <a:endParaRPr lang="en-US" dirty="0"/>
-          </a:p>
-        </p:txBody>
-      </p:sp>
-      <p:sp>
-        <p:nvSpPr>
-          <p:cNvPr id="6" name="Footer Placeholder 5"/>
-          <p:cNvSpPr>
-            <a:spLocks noGrp="1"/>
-          </p:cNvSpPr>
-          <p:nvPr>
-            <p:ph type="ftr" sz="quarter" idx="12"/>
-          </p:nvPr>
-        </p:nvSpPr>
-        <p:spPr>
-          <a:xfrm>
-            <a:off x="0" y="8685213"/>
-            <a:ext cx="6172200" cy="457200"/>
-          </a:xfrm>
-        </p:spPr>
-        <p:txBody>
-          <a:bodyPr/>
-          <a:lstStyle/>
-          <a:p>
-            <a:r>
-              <a:rPr lang="en-US" sz="500" dirty="0">
-                <a:solidFill>
-                  <a:srgbClr val="000000"/>
-                </a:solidFill>
-                <a:latin typeface="Segoe UI" pitchFamily="34" charset="0"/>
-              </a:rPr>
-              <a:t>© 2010 Microsoft Corporation. All rights reserved. Microsoft, Windows, Windows Vista and other product names are or may be registered trademarks and/or trademarks in the U.S. and/or other countries.</a:t>
-            </a:r>
-          </a:p>
-          <a:p>
-            <a:r>
-              <a:rPr lang="en-US" sz="500" dirty="0">
-                <a:solidFill>
-                  <a:srgbClr val="000000"/>
-                </a:solidFill>
-                <a:latin typeface="Segoe UI" pitchFamily="34" charset="0"/>
-              </a:rPr>
-              <a:t>The information herein is for informational purposes only and represents the current view of Microsoft Corporation as of the date of this presentation.  Because Microsoft must respond to changing market conditions, it should not be interpreted to be a commitment on the part of Microsoft, and Microsoft cannot guarantee the accuracy of any information provided after the date of this presentation.  </a:t>
-            </a:r>
-            <a:br>
-              <a:rPr lang="en-US" sz="500" dirty="0">
-                <a:solidFill>
-                  <a:srgbClr val="000000"/>
-                </a:solidFill>
-                <a:latin typeface="Segoe UI" pitchFamily="34" charset="0"/>
-              </a:rPr>
-            </a:br>
-            <a:r>
-              <a:rPr lang="en-US" sz="500" dirty="0">
-                <a:solidFill>
-                  <a:srgbClr val="000000"/>
-                </a:solidFill>
-                <a:latin typeface="Segoe UI" pitchFamily="34" charset="0"/>
-              </a:rPr>
-              <a:t>MICROSOFT MAKES NO WARRANTIES, EXPRESS, IMPLIED OR STATUTORY, AS TO THE INFORMATION IN THIS PRESENTATION.</a:t>
-            </a:r>
-          </a:p>
-          <a:p>
-            <a:endParaRPr lang="en-US" sz="500" dirty="0">
-              <a:latin typeface="Segoe UI" pitchFamily="34" charset="0"/>
-            </a:endParaRPr>
-          </a:p>
-        </p:txBody>
-      </p:sp>
-      <p:sp>
-        <p:nvSpPr>
-          <p:cNvPr id="7" name="Slide Number Placeholder 6"/>
-          <p:cNvSpPr>
-            <a:spLocks noGrp="1"/>
-          </p:cNvSpPr>
-          <p:nvPr>
-            <p:ph type="sldNum" sz="quarter" idx="13"/>
-          </p:nvPr>
-        </p:nvSpPr>
-        <p:spPr>
-          <a:xfrm>
-            <a:off x="6172199" y="8685213"/>
-            <a:ext cx="684213" cy="457200"/>
-          </a:xfrm>
-        </p:spPr>
-        <p:txBody>
-          <a:bodyPr/>
-          <a:lstStyle/>
-          <a:p>
-            <a:fld id="{EC87E0CF-87F6-4B58-B8B8-DCAB2DAAF3CA}" type="slidenum">
-              <a:rPr lang="en-US" smtClean="0"/>
-              <a:pPr/>
-              <a:t>27</a:t>
-            </a:fld>
-            <a:endParaRPr lang="en-US" dirty="0"/>
-          </a:p>
-        </p:txBody>
-      </p:sp>
-    </p:spTree>
-    <p:extLst>
-      <p:ext uri="{BB962C8B-B14F-4D97-AF65-F5344CB8AC3E}">
-        <p14:creationId xmlns:p14="http://schemas.microsoft.com/office/powerpoint/2010/main" val="4226960380"/>
-      </p:ext>
-    </p:extLst>
-  </p:cSld>
-  <p:clrMapOvr>
-    <a:masterClrMapping/>
-  </p:clrMapOvr>
-</p:notes>
-</file>
-
 <file path=ppt/notesSlides/notesSlide2.xml><?xml version="1.0" encoding="utf-8"?>
 <p:notes xmlns:a="http://schemas.openxmlformats.org/drawingml/2006/main" xmlns:r="http://schemas.openxmlformats.org/officeDocument/2006/relationships" xmlns:p="http://schemas.openxmlformats.org/presentationml/2006/main">
   <p:cSld>
@@ -2433,7 +2224,7 @@
           <a:p>
             <a:fld id="{0EE1B543-F909-4FF1-B2FE-428AB4A87B52}" type="datetime1">
               <a:rPr lang="en-US" smtClean="0"/>
-              <a:t>8/5/2016</a:t>
+              <a:t>9/23/2016</a:t>
             </a:fld>
             <a:endParaRPr lang="en-US" dirty="0"/>
           </a:p>
@@ -2720,7 +2511,7 @@
           <a:p>
             <a:fld id="{B6E37EB7-D403-45A2-AB5E-D280C516BC85}" type="datetime1">
               <a:rPr lang="en-US" smtClean="0"/>
-              <a:t>8/5/2016</a:t>
+              <a:t>9/23/2016</a:t>
             </a:fld>
             <a:endParaRPr lang="en-US" dirty="0"/>
           </a:p>
@@ -3011,7 +2802,7 @@
           <a:p>
             <a:fld id="{78D6D4BB-0428-4E19-B8E6-33EBEF93452B}" type="datetime1">
               <a:rPr lang="en-US" smtClean="0"/>
-              <a:t>8/5/2016</a:t>
+              <a:t>9/23/2016</a:t>
             </a:fld>
             <a:endParaRPr lang="en-US" dirty="0"/>
           </a:p>
@@ -3344,7 +3135,7 @@
           <a:p>
             <a:fld id="{E2EB21BC-B6B7-45A0-831A-39A08F64FEEE}" type="datetime1">
               <a:rPr lang="en-US" smtClean="0"/>
-              <a:t>8/5/2016</a:t>
+              <a:t>9/23/2016</a:t>
             </a:fld>
             <a:endParaRPr lang="en-US" dirty="0"/>
           </a:p>
@@ -3703,7 +3494,7 @@
           <a:p>
             <a:fld id="{D01B1534-8D07-4037-A73D-B2B2270F597C}" type="datetime1">
               <a:rPr lang="en-US" smtClean="0"/>
-              <a:t>8/5/2016</a:t>
+              <a:t>9/23/2016</a:t>
             </a:fld>
             <a:endParaRPr lang="en-US" dirty="0"/>
           </a:p>
@@ -4047,7 +3838,7 @@
           <a:p>
             <a:fld id="{3BA250D4-12A0-43C8-A1CF-99BCBDD8B988}" type="datetime1">
               <a:rPr lang="en-US" smtClean="0"/>
-              <a:t>8/5/2016</a:t>
+              <a:t>9/23/2016</a:t>
             </a:fld>
             <a:endParaRPr lang="en-US" dirty="0"/>
           </a:p>
@@ -4539,7 +4330,7 @@
           <a:p>
             <a:fld id="{E59661DB-8378-4CD0-AFBE-01F12CFCF0EB}" type="datetime1">
               <a:rPr lang="en-US" smtClean="0"/>
-              <a:t>8/5/2016</a:t>
+              <a:t>9/23/2016</a:t>
             </a:fld>
             <a:endParaRPr lang="en-US" dirty="0"/>
           </a:p>
@@ -4764,7 +4555,7 @@
           <a:p>
             <a:fld id="{47978105-B0CE-4596-84BB-C9F093A62A71}" type="datetime1">
               <a:rPr lang="en-US" smtClean="0"/>
-              <a:t>8/5/2016</a:t>
+              <a:t>9/23/2016</a:t>
             </a:fld>
             <a:endParaRPr lang="en-US" dirty="0"/>
           </a:p>
@@ -4966,7 +4757,7 @@
           <a:p>
             <a:fld id="{525E11DF-B9CA-48C5-81E6-337899557DC2}" type="datetime1">
               <a:rPr lang="en-US" smtClean="0"/>
-              <a:t>8/5/2016</a:t>
+              <a:t>9/23/2016</a:t>
             </a:fld>
             <a:endParaRPr lang="en-US" dirty="0"/>
           </a:p>
@@ -5284,7 +5075,7 @@
           <a:p>
             <a:fld id="{4803EA06-4E45-4653-A29C-5A7E490F3733}" type="datetime1">
               <a:rPr lang="en-US" smtClean="0"/>
-              <a:t>8/5/2016</a:t>
+              <a:t>9/23/2016</a:t>
             </a:fld>
             <a:endParaRPr lang="en-US" dirty="0"/>
           </a:p>
@@ -5811,7 +5602,7 @@
           <a:p>
             <a:fld id="{2DB3552D-7290-43DD-AD07-60F561629260}" type="datetime1">
               <a:rPr lang="en-US" smtClean="0"/>
-              <a:t>8/5/2016</a:t>
+              <a:t>9/23/2016</a:t>
             </a:fld>
             <a:endParaRPr lang="en-US" dirty="0"/>
           </a:p>
@@ -6259,7 +6050,7 @@
           <a:p>
             <a:fld id="{BC367024-4554-4F1F-91AB-08006E299A3C}" type="datetime1">
               <a:rPr lang="en-US" smtClean="0"/>
-              <a:t>8/5/2016</a:t>
+              <a:t>9/23/2016</a:t>
             </a:fld>
             <a:endParaRPr lang="en-US" dirty="0"/>
           </a:p>
@@ -14171,7 +13962,7 @@
       </p:sp>
       <p:pic>
         <p:nvPicPr>
-          <p:cNvPr id="8" name="Picture 7"/>
+          <p:cNvPr id="4" name="Picture 3"/>
           <p:cNvPicPr>
             <a:picLocks noChangeAspect="1"/>
           </p:cNvPicPr>
@@ -14185,8 +13976,8 @@
         </p:blipFill>
         <p:spPr>
           <a:xfrm>
-            <a:off x="1267298" y="1013401"/>
-            <a:ext cx="4748212" cy="3038855"/>
+            <a:off x="1524000" y="1690329"/>
+            <a:ext cx="5753100" cy="3416300"/>
           </a:xfrm>
           <a:prstGeom prst="rect">
             <a:avLst/>
@@ -14195,7 +13986,7 @@
       </p:pic>
       <p:pic>
         <p:nvPicPr>
-          <p:cNvPr id="9" name="Picture 8"/>
+          <p:cNvPr id="5" name="Picture 4"/>
           <p:cNvPicPr>
             <a:picLocks noChangeAspect="1"/>
           </p:cNvPicPr>
@@ -14209,8 +14000,8 @@
         </p:blipFill>
         <p:spPr>
           <a:xfrm>
-            <a:off x="1267298" y="4342800"/>
-            <a:ext cx="4754880" cy="609600"/>
+            <a:off x="7738665" y="1947699"/>
+            <a:ext cx="2139734" cy="1194917"/>
           </a:xfrm>
           <a:prstGeom prst="rect">
             <a:avLst/>
@@ -14219,7 +14010,7 @@
       </p:pic>
       <p:pic>
         <p:nvPicPr>
-          <p:cNvPr id="2" name="Picture 1"/>
+          <p:cNvPr id="7" name="Picture 6"/>
           <p:cNvPicPr>
             <a:picLocks noChangeAspect="1"/>
           </p:cNvPicPr>
@@ -14233,8 +14024,32 @@
         </p:blipFill>
         <p:spPr>
           <a:xfrm>
-            <a:off x="6674650" y="1013405"/>
-            <a:ext cx="1317864" cy="5536263"/>
+            <a:off x="7733054" y="4965784"/>
+            <a:ext cx="2299391" cy="919757"/>
+          </a:xfrm>
+          <a:prstGeom prst="rect">
+            <a:avLst/>
+          </a:prstGeom>
+        </p:spPr>
+      </p:pic>
+      <p:pic>
+        <p:nvPicPr>
+          <p:cNvPr id="10" name="Picture 9"/>
+          <p:cNvPicPr>
+            <a:picLocks noChangeAspect="1"/>
+          </p:cNvPicPr>
+          <p:nvPr/>
+        </p:nvPicPr>
+        <p:blipFill>
+          <a:blip r:embed="rId6"/>
+          <a:stretch>
+            <a:fillRect/>
+          </a:stretch>
+        </p:blipFill>
+        <p:spPr>
+          <a:xfrm>
+            <a:off x="7733054" y="3464211"/>
+            <a:ext cx="3754480" cy="1179978"/>
           </a:xfrm>
           <a:prstGeom prst="rect">
             <a:avLst/>
@@ -17425,63 +17240,29 @@
           </a:p>
         </p:txBody>
       </p:sp>
-      <p:sp>
-        <p:nvSpPr>
-          <p:cNvPr id="3" name="Content Placeholder 2"/>
-          <p:cNvSpPr>
-            <a:spLocks noGrp="1"/>
-          </p:cNvSpPr>
+      <p:pic>
+        <p:nvPicPr>
+          <p:cNvPr id="4" name="Content Placeholder 3"/>
+          <p:cNvPicPr>
+            <a:picLocks noGrp="1" noChangeAspect="1"/>
+          </p:cNvPicPr>
           <p:nvPr>
             <p:ph idx="1"/>
           </p:nvPr>
-        </p:nvSpPr>
-        <p:spPr/>
-        <p:txBody>
-          <a:bodyPr>
-            <a:normAutofit/>
-          </a:bodyPr>
-          <a:lstStyle/>
-          <a:p>
-            <a:r>
-              <a:rPr lang="en-US" dirty="0">
-                <a:hlinkClick r:id="rId2"/>
-              </a:rPr>
-              <a:t>http://TulsaTechFest.com</a:t>
-            </a:r>
-            <a:r>
-              <a:rPr lang="en-US" dirty="0"/>
-              <a:t> </a:t>
-            </a:r>
-          </a:p>
-          <a:p>
-            <a:r>
-              <a:rPr lang="en-US" dirty="0"/>
-              <a:t>Fill them out!</a:t>
-            </a:r>
-          </a:p>
-          <a:p>
-            <a:r>
-              <a:rPr lang="en-US" dirty="0"/>
-              <a:t>You can win additional prizes!</a:t>
-            </a:r>
-          </a:p>
-          <a:p>
-            <a:r>
-              <a:rPr lang="en-US" dirty="0"/>
-              <a:t>Like a $50 Best Buy Gift Card!!</a:t>
-            </a:r>
-          </a:p>
-          <a:p>
-            <a:r>
-              <a:rPr lang="en-US" dirty="0"/>
-              <a:t>Winner drawn – Midnight, Sun Aug 7th!</a:t>
-            </a:r>
-          </a:p>
-          <a:p>
-            <a:endParaRPr lang="en-US" dirty="0"/>
-          </a:p>
-        </p:txBody>
-      </p:sp>
+        </p:nvPicPr>
+        <p:blipFill>
+          <a:blip r:embed="rId2"/>
+          <a:stretch>
+            <a:fillRect/>
+          </a:stretch>
+        </p:blipFill>
+        <p:spPr>
+          <a:xfrm>
+            <a:off x="3908383" y="2002563"/>
+            <a:ext cx="3382753" cy="3382753"/>
+          </a:xfrm>
+        </p:spPr>
+      </p:pic>
     </p:spTree>
     <p:extLst>
       <p:ext uri="{BB962C8B-B14F-4D97-AF65-F5344CB8AC3E}">
@@ -17496,169 +17277,6 @@
 </file>
 
 <file path=ppt/slides/slide27.xml><?xml version="1.0" encoding="utf-8"?>
-<p:sld xmlns:a="http://schemas.openxmlformats.org/drawingml/2006/main" xmlns:r="http://schemas.openxmlformats.org/officeDocument/2006/relationships" xmlns:p="http://schemas.openxmlformats.org/presentationml/2006/main">
-  <p:cSld>
-    <p:spTree>
-      <p:nvGrpSpPr>
-        <p:cNvPr id="1" name=""/>
-        <p:cNvGrpSpPr/>
-        <p:nvPr/>
-      </p:nvGrpSpPr>
-      <p:grpSpPr>
-        <a:xfrm>
-          <a:off x="0" y="0"/>
-          <a:ext cx="0" cy="0"/>
-          <a:chOff x="0" y="0"/>
-          <a:chExt cx="0" cy="0"/>
-        </a:xfrm>
-      </p:grpSpPr>
-      <p:sp>
-        <p:nvSpPr>
-          <p:cNvPr id="3" name="TextBox 2"/>
-          <p:cNvSpPr txBox="1"/>
-          <p:nvPr/>
-        </p:nvSpPr>
-        <p:spPr>
-          <a:xfrm>
-            <a:off x="7733054" y="951665"/>
-            <a:ext cx="4074911" cy="738664"/>
-          </a:xfrm>
-          <a:prstGeom prst="rect">
-            <a:avLst/>
-          </a:prstGeom>
-          <a:noFill/>
-        </p:spPr>
-        <p:txBody>
-          <a:bodyPr wrap="square" lIns="0" tIns="0" rIns="0" bIns="0" rtlCol="0">
-            <a:spAutoFit/>
-          </a:bodyPr>
-          <a:lstStyle/>
-          <a:p>
-            <a:pPr algn="ctr"/>
-            <a:r>
-              <a:rPr lang="en-US" sz="2400" b="1" dirty="0">
-                <a:gradFill>
-                  <a:gsLst>
-                    <a:gs pos="0">
-                      <a:schemeClr val="tx1"/>
-                    </a:gs>
-                    <a:gs pos="86000">
-                      <a:schemeClr val="tx1"/>
-                    </a:gs>
-                  </a:gsLst>
-                  <a:lin ang="5400000" scaled="0"/>
-                </a:gradFill>
-              </a:rPr>
-              <a:t>Please help us!</a:t>
-            </a:r>
-          </a:p>
-          <a:p>
-            <a:pPr algn="ctr"/>
-            <a:r>
-              <a:rPr lang="en-US" sz="2400" b="1" dirty="0">
-                <a:gradFill>
-                  <a:gsLst>
-                    <a:gs pos="0">
-                      <a:schemeClr val="tx1"/>
-                    </a:gs>
-                    <a:gs pos="86000">
-                      <a:schemeClr val="tx1"/>
-                    </a:gs>
-                  </a:gsLst>
-                  <a:lin ang="5400000" scaled="0"/>
-                </a:gradFill>
-              </a:rPr>
-              <a:t>Thank our Sponsors:</a:t>
-            </a:r>
-          </a:p>
-        </p:txBody>
-      </p:sp>
-      <p:pic>
-        <p:nvPicPr>
-          <p:cNvPr id="8" name="Picture 7"/>
-          <p:cNvPicPr>
-            <a:picLocks noChangeAspect="1"/>
-          </p:cNvPicPr>
-          <p:nvPr/>
-        </p:nvPicPr>
-        <p:blipFill>
-          <a:blip r:embed="rId3"/>
-          <a:stretch>
-            <a:fillRect/>
-          </a:stretch>
-        </p:blipFill>
-        <p:spPr>
-          <a:xfrm>
-            <a:off x="1267298" y="1013401"/>
-            <a:ext cx="4748212" cy="3038855"/>
-          </a:xfrm>
-          <a:prstGeom prst="rect">
-            <a:avLst/>
-          </a:prstGeom>
-        </p:spPr>
-      </p:pic>
-      <p:pic>
-        <p:nvPicPr>
-          <p:cNvPr id="9" name="Picture 8"/>
-          <p:cNvPicPr>
-            <a:picLocks noChangeAspect="1"/>
-          </p:cNvPicPr>
-          <p:nvPr/>
-        </p:nvPicPr>
-        <p:blipFill>
-          <a:blip r:embed="rId4"/>
-          <a:stretch>
-            <a:fillRect/>
-          </a:stretch>
-        </p:blipFill>
-        <p:spPr>
-          <a:xfrm>
-            <a:off x="1267298" y="4342800"/>
-            <a:ext cx="4754880" cy="609600"/>
-          </a:xfrm>
-          <a:prstGeom prst="rect">
-            <a:avLst/>
-          </a:prstGeom>
-        </p:spPr>
-      </p:pic>
-      <p:pic>
-        <p:nvPicPr>
-          <p:cNvPr id="2" name="Picture 1"/>
-          <p:cNvPicPr>
-            <a:picLocks noChangeAspect="1"/>
-          </p:cNvPicPr>
-          <p:nvPr/>
-        </p:nvPicPr>
-        <p:blipFill>
-          <a:blip r:embed="rId5"/>
-          <a:stretch>
-            <a:fillRect/>
-          </a:stretch>
-        </p:blipFill>
-        <p:spPr>
-          <a:xfrm>
-            <a:off x="6674650" y="1013405"/>
-            <a:ext cx="1317864" cy="5536263"/>
-          </a:xfrm>
-          <a:prstGeom prst="rect">
-            <a:avLst/>
-          </a:prstGeom>
-        </p:spPr>
-      </p:pic>
-    </p:spTree>
-    <p:extLst>
-      <p:ext uri="{BB962C8B-B14F-4D97-AF65-F5344CB8AC3E}">
-        <p14:creationId xmlns:p14="http://schemas.microsoft.com/office/powerpoint/2010/main" val="2917082535"/>
-      </p:ext>
-    </p:extLst>
-  </p:cSld>
-  <p:clrMapOvr>
-    <a:masterClrMapping/>
-  </p:clrMapOvr>
-</p:sld>
-</file>
-
-<file path=ppt/slides/slide28.xml><?xml version="1.0" encoding="utf-8"?>
 <p:sld xmlns:a="http://schemas.openxmlformats.org/drawingml/2006/main" xmlns:r="http://schemas.openxmlformats.org/officeDocument/2006/relationships" xmlns:p="http://schemas.openxmlformats.org/presentationml/2006/main">
   <p:cSld>
     <p:spTree>
@@ -17879,12 +17497,6 @@
             <a:r>
               <a:rPr lang="en-US" dirty="0"/>
               <a:t>Bathrooms</a:t>
-            </a:r>
-          </a:p>
-          <a:p>
-            <a:r>
-              <a:rPr lang="en-US" dirty="0"/>
-              <a:t>Internet – OSU-WIRELESS</a:t>
             </a:r>
           </a:p>
         </p:txBody>

</xml_diff>